<commit_message>
Final Draft 3, added main wireframes
</commit_message>
<xml_diff>
--- a/FINAL/Final Draft 2.pptx
+++ b/FINAL/Final Draft 2.pptx
@@ -5605,14 +5605,14 @@
           <p:nvPr>
             <p:extLst>
               <p:ext uri="{D42A27DB-BD31-4B8C-83A1-F6EECF244321}">
-                <p14:modId xmlns:p14="http://schemas.microsoft.com/office/powerpoint/2010/main" val="3880701616"/>
+                <p14:modId xmlns:p14="http://schemas.microsoft.com/office/powerpoint/2010/main" val="1448543878"/>
               </p:ext>
             </p:extLst>
           </p:nvPr>
         </p:nvGraphicFramePr>
         <p:xfrm>
           <a:off x="838198" y="1293541"/>
-          <a:ext cx="9197900" cy="4358640"/>
+          <a:ext cx="9197900" cy="4754880"/>
         </p:xfrm>
         <a:graphic>
           <a:graphicData uri="http://schemas.openxmlformats.org/drawingml/2006/table">
@@ -6346,6 +6346,137 @@
                 <a:extLst>
                   <a:ext uri="{0D108BD9-81ED-4DB2-BD59-A6C34878D82A}">
                     <a16:rowId xmlns:a16="http://schemas.microsoft.com/office/drawing/2014/main" val="3835657887"/>
+                  </a:ext>
+                </a:extLst>
+              </a:tr>
+              <a:tr h="370840">
+                <a:tc>
+                  <a:txBody>
+                    <a:bodyPr/>
+                    <a:lstStyle/>
+                    <a:p>
+                      <a:pPr marL="0" marR="0" lvl="0" indent="0" algn="l" defTabSz="914400" rtl="0" eaLnBrk="1" fontAlgn="auto" latinLnBrk="0" hangingPunct="1">
+                        <a:lnSpc>
+                          <a:spcPct val="100000"/>
+                        </a:lnSpc>
+                        <a:spcBef>
+                          <a:spcPts val="0"/>
+                        </a:spcBef>
+                        <a:spcAft>
+                          <a:spcPts val="0"/>
+                        </a:spcAft>
+                        <a:buClrTx/>
+                        <a:buSzTx/>
+                        <a:buFontTx/>
+                        <a:buNone/>
+                        <a:tabLst/>
+                        <a:defRPr/>
+                      </a:pPr>
+                      <a:r>
+                        <a:rPr lang="en-US" sz="2000" b="0" dirty="0">
+                          <a:solidFill>
+                            <a:schemeClr val="tx1"/>
+                          </a:solidFill>
+                        </a:rPr>
+                        <a:t>/category/computing</a:t>
+                      </a:r>
+                    </a:p>
+                  </a:txBody>
+                  <a:tcPr>
+                    <a:lnL w="12700" cap="flat" cmpd="sng" algn="ctr">
+                      <a:noFill/>
+                      <a:prstDash val="solid"/>
+                      <a:round/>
+                      <a:headEnd type="none" w="med" len="med"/>
+                      <a:tailEnd type="none" w="med" len="med"/>
+                    </a:lnL>
+                    <a:lnR w="12700" cap="flat" cmpd="sng" algn="ctr">
+                      <a:noFill/>
+                      <a:prstDash val="solid"/>
+                      <a:round/>
+                      <a:headEnd type="none" w="med" len="med"/>
+                      <a:tailEnd type="none" w="med" len="med"/>
+                    </a:lnR>
+                    <a:lnT w="12700" cap="flat" cmpd="sng" algn="ctr">
+                      <a:noFill/>
+                      <a:prstDash val="solid"/>
+                      <a:round/>
+                      <a:headEnd type="none" w="med" len="med"/>
+                      <a:tailEnd type="none" w="med" len="med"/>
+                    </a:lnT>
+                    <a:lnB w="12700" cap="flat" cmpd="sng" algn="ctr">
+                      <a:noFill/>
+                      <a:prstDash val="solid"/>
+                      <a:round/>
+                      <a:headEnd type="none" w="med" len="med"/>
+                      <a:tailEnd type="none" w="med" len="med"/>
+                    </a:lnB>
+                    <a:lnTlToBr w="12700" cmpd="sng">
+                      <a:noFill/>
+                      <a:prstDash val="solid"/>
+                    </a:lnTlToBr>
+                    <a:lnBlToTr w="12700" cmpd="sng">
+                      <a:noFill/>
+                      <a:prstDash val="solid"/>
+                    </a:lnBlToTr>
+                    <a:noFill/>
+                  </a:tcPr>
+                </a:tc>
+                <a:tc>
+                  <a:txBody>
+                    <a:bodyPr/>
+                    <a:lstStyle/>
+                    <a:p>
+                      <a:endParaRPr lang="en-US" sz="2000" b="0" dirty="0">
+                        <a:solidFill>
+                          <a:schemeClr val="tx1"/>
+                        </a:solidFill>
+                      </a:endParaRPr>
+                    </a:p>
+                  </a:txBody>
+                  <a:tcPr>
+                    <a:lnL w="12700" cap="flat" cmpd="sng" algn="ctr">
+                      <a:noFill/>
+                      <a:prstDash val="solid"/>
+                      <a:round/>
+                      <a:headEnd type="none" w="med" len="med"/>
+                      <a:tailEnd type="none" w="med" len="med"/>
+                    </a:lnL>
+                    <a:lnR w="12700" cap="flat" cmpd="sng" algn="ctr">
+                      <a:noFill/>
+                      <a:prstDash val="solid"/>
+                      <a:round/>
+                      <a:headEnd type="none" w="med" len="med"/>
+                      <a:tailEnd type="none" w="med" len="med"/>
+                    </a:lnR>
+                    <a:lnT w="12700" cap="flat" cmpd="sng" algn="ctr">
+                      <a:noFill/>
+                      <a:prstDash val="solid"/>
+                      <a:round/>
+                      <a:headEnd type="none" w="med" len="med"/>
+                      <a:tailEnd type="none" w="med" len="med"/>
+                    </a:lnT>
+                    <a:lnB w="12700" cap="flat" cmpd="sng" algn="ctr">
+                      <a:noFill/>
+                      <a:prstDash val="solid"/>
+                      <a:round/>
+                      <a:headEnd type="none" w="med" len="med"/>
+                      <a:tailEnd type="none" w="med" len="med"/>
+                    </a:lnB>
+                    <a:lnTlToBr w="12700" cmpd="sng">
+                      <a:noFill/>
+                      <a:prstDash val="solid"/>
+                    </a:lnTlToBr>
+                    <a:lnBlToTr w="12700" cmpd="sng">
+                      <a:noFill/>
+                      <a:prstDash val="solid"/>
+                    </a:lnBlToTr>
+                    <a:noFill/>
+                  </a:tcPr>
+                </a:tc>
+                <a:extLst>
+                  <a:ext uri="{0D108BD9-81ED-4DB2-BD59-A6C34878D82A}">
+                    <a16:rowId xmlns:a16="http://schemas.microsoft.com/office/drawing/2014/main" val="1601183557"/>
                   </a:ext>
                 </a:extLst>
               </a:tr>
@@ -6623,14 +6754,11 @@
                     <a:bodyPr/>
                     <a:lstStyle/>
                     <a:p>
-                      <a:r>
-                        <a:rPr lang="en-US" sz="2000" b="0" dirty="0">
-                          <a:solidFill>
-                            <a:schemeClr val="tx1"/>
-                          </a:solidFill>
-                        </a:rPr>
-                        <a:t>/latest-questions</a:t>
-                      </a:r>
+                      <a:endParaRPr lang="en-US" sz="2000" b="0" dirty="0">
+                        <a:solidFill>
+                          <a:schemeClr val="tx1"/>
+                        </a:solidFill>
+                      </a:endParaRPr>
                     </a:p>
                   </a:txBody>
                   <a:tcPr>
@@ -6737,14 +6865,11 @@
                     <a:bodyPr/>
                     <a:lstStyle/>
                     <a:p>
-                      <a:r>
-                        <a:rPr lang="en-US" sz="2000" b="0" dirty="0">
-                          <a:solidFill>
-                            <a:schemeClr val="tx1"/>
-                          </a:solidFill>
-                        </a:rPr>
-                        <a:t>/top-questions</a:t>
-                      </a:r>
+                      <a:endParaRPr lang="en-US" sz="2000" b="0" dirty="0">
+                        <a:solidFill>
+                          <a:schemeClr val="tx1"/>
+                        </a:solidFill>
+                      </a:endParaRPr>
                     </a:p>
                   </a:txBody>
                   <a:tcPr>
@@ -6851,14 +6976,11 @@
                     <a:bodyPr/>
                     <a:lstStyle/>
                     <a:p>
-                      <a:r>
-                        <a:rPr lang="en-US" sz="2000" b="0" dirty="0">
-                          <a:solidFill>
-                            <a:schemeClr val="tx1"/>
-                          </a:solidFill>
-                        </a:rPr>
-                        <a:t>/unanswered-questions</a:t>
-                      </a:r>
+                      <a:endParaRPr lang="en-US" sz="2000" b="0" dirty="0">
+                        <a:solidFill>
+                          <a:schemeClr val="tx1"/>
+                        </a:solidFill>
+                      </a:endParaRPr>
                     </a:p>
                   </a:txBody>
                   <a:tcPr>

</xml_diff>